<commit_message>
CI/CD Pipeline updated in ppt
</commit_message>
<xml_diff>
--- a/docs/Demo Project.pptx
+++ b/docs/Demo Project.pptx
@@ -6,6 +6,7 @@
   </p:sldMasterIdLst>
   <p:sldIdLst>
     <p:sldId id="256" r:id="rId2"/>
+    <p:sldId id="257" r:id="rId3"/>
   </p:sldIdLst>
   <p:sldSz cx="12192000" cy="6858000"/>
   <p:notesSz cx="6858000" cy="9144000"/>
@@ -104,6 +105,11 @@
       </a:defRPr>
     </a:lvl9pPr>
   </p:defaultTextStyle>
+  <p:extLst>
+    <p:ext uri="{EFAFB233-063F-42B5-8137-9DF3F51BA10A}">
+      <p15:sldGuideLst xmlns:p15="http://schemas.microsoft.com/office/powerpoint/2012/main"/>
+    </p:ext>
+  </p:extLst>
 </p:presentation>
 </file>
 
@@ -256,7 +262,7 @@
           <a:p>
             <a:fld id="{851B1ACC-A14B-4B46-9758-5D8AF8DCD017}" type="datetimeFigureOut">
               <a:rPr lang="en-IN" smtClean="0"/>
-              <a:t>21-07-2020</a:t>
+              <a:t>22-07-2020</a:t>
             </a:fld>
             <a:endParaRPr lang="en-IN"/>
           </a:p>
@@ -456,7 +462,7 @@
           <a:p>
             <a:fld id="{851B1ACC-A14B-4B46-9758-5D8AF8DCD017}" type="datetimeFigureOut">
               <a:rPr lang="en-IN" smtClean="0"/>
-              <a:t>21-07-2020</a:t>
+              <a:t>22-07-2020</a:t>
             </a:fld>
             <a:endParaRPr lang="en-IN"/>
           </a:p>
@@ -666,7 +672,7 @@
           <a:p>
             <a:fld id="{851B1ACC-A14B-4B46-9758-5D8AF8DCD017}" type="datetimeFigureOut">
               <a:rPr lang="en-IN" smtClean="0"/>
-              <a:t>21-07-2020</a:t>
+              <a:t>22-07-2020</a:t>
             </a:fld>
             <a:endParaRPr lang="en-IN"/>
           </a:p>
@@ -866,7 +872,7 @@
           <a:p>
             <a:fld id="{851B1ACC-A14B-4B46-9758-5D8AF8DCD017}" type="datetimeFigureOut">
               <a:rPr lang="en-IN" smtClean="0"/>
-              <a:t>21-07-2020</a:t>
+              <a:t>22-07-2020</a:t>
             </a:fld>
             <a:endParaRPr lang="en-IN"/>
           </a:p>
@@ -1142,7 +1148,7 @@
           <a:p>
             <a:fld id="{851B1ACC-A14B-4B46-9758-5D8AF8DCD017}" type="datetimeFigureOut">
               <a:rPr lang="en-IN" smtClean="0"/>
-              <a:t>21-07-2020</a:t>
+              <a:t>22-07-2020</a:t>
             </a:fld>
             <a:endParaRPr lang="en-IN"/>
           </a:p>
@@ -1410,7 +1416,7 @@
           <a:p>
             <a:fld id="{851B1ACC-A14B-4B46-9758-5D8AF8DCD017}" type="datetimeFigureOut">
               <a:rPr lang="en-IN" smtClean="0"/>
-              <a:t>21-07-2020</a:t>
+              <a:t>22-07-2020</a:t>
             </a:fld>
             <a:endParaRPr lang="en-IN"/>
           </a:p>
@@ -1825,7 +1831,7 @@
           <a:p>
             <a:fld id="{851B1ACC-A14B-4B46-9758-5D8AF8DCD017}" type="datetimeFigureOut">
               <a:rPr lang="en-IN" smtClean="0"/>
-              <a:t>21-07-2020</a:t>
+              <a:t>22-07-2020</a:t>
             </a:fld>
             <a:endParaRPr lang="en-IN"/>
           </a:p>
@@ -1967,7 +1973,7 @@
           <a:p>
             <a:fld id="{851B1ACC-A14B-4B46-9758-5D8AF8DCD017}" type="datetimeFigureOut">
               <a:rPr lang="en-IN" smtClean="0"/>
-              <a:t>21-07-2020</a:t>
+              <a:t>22-07-2020</a:t>
             </a:fld>
             <a:endParaRPr lang="en-IN"/>
           </a:p>
@@ -2080,7 +2086,7 @@
           <a:p>
             <a:fld id="{851B1ACC-A14B-4B46-9758-5D8AF8DCD017}" type="datetimeFigureOut">
               <a:rPr lang="en-IN" smtClean="0"/>
-              <a:t>21-07-2020</a:t>
+              <a:t>22-07-2020</a:t>
             </a:fld>
             <a:endParaRPr lang="en-IN"/>
           </a:p>
@@ -2393,7 +2399,7 @@
           <a:p>
             <a:fld id="{851B1ACC-A14B-4B46-9758-5D8AF8DCD017}" type="datetimeFigureOut">
               <a:rPr lang="en-IN" smtClean="0"/>
-              <a:t>21-07-2020</a:t>
+              <a:t>22-07-2020</a:t>
             </a:fld>
             <a:endParaRPr lang="en-IN"/>
           </a:p>
@@ -2682,7 +2688,7 @@
           <a:p>
             <a:fld id="{851B1ACC-A14B-4B46-9758-5D8AF8DCD017}" type="datetimeFigureOut">
               <a:rPr lang="en-IN" smtClean="0"/>
-              <a:t>21-07-2020</a:t>
+              <a:t>22-07-2020</a:t>
             </a:fld>
             <a:endParaRPr lang="en-IN"/>
           </a:p>
@@ -2925,7 +2931,7 @@
           <a:p>
             <a:fld id="{851B1ACC-A14B-4B46-9758-5D8AF8DCD017}" type="datetimeFigureOut">
               <a:rPr lang="en-IN" smtClean="0"/>
-              <a:t>21-07-2020</a:t>
+              <a:t>22-07-2020</a:t>
             </a:fld>
             <a:endParaRPr lang="en-IN"/>
           </a:p>
@@ -5050,6 +5056,1311 @@
 </p:sld>
 </file>
 
+<file path=ppt/slides/slide2.xml><?xml version="1.0" encoding="utf-8"?>
+<p:sld xmlns:a="http://schemas.openxmlformats.org/drawingml/2006/main" xmlns:r="http://schemas.openxmlformats.org/officeDocument/2006/relationships" xmlns:p="http://schemas.openxmlformats.org/presentationml/2006/main">
+  <p:cSld>
+    <p:spTree>
+      <p:nvGrpSpPr>
+        <p:cNvPr id="1" name=""/>
+        <p:cNvGrpSpPr/>
+        <p:nvPr/>
+      </p:nvGrpSpPr>
+      <p:grpSpPr>
+        <a:xfrm>
+          <a:off x="0" y="0"/>
+          <a:ext cx="0" cy="0"/>
+          <a:chOff x="0" y="0"/>
+          <a:chExt cx="0" cy="0"/>
+        </a:xfrm>
+      </p:grpSpPr>
+      <p:sp>
+        <p:nvSpPr>
+          <p:cNvPr id="2" name="Rectangle 1">
+            <a:extLst>
+              <a:ext uri="{FF2B5EF4-FFF2-40B4-BE49-F238E27FC236}">
+                <a16:creationId xmlns:a16="http://schemas.microsoft.com/office/drawing/2014/main" id="{31F51F6F-AE9D-427F-8328-F7FCF59F7ABC}"/>
+              </a:ext>
+            </a:extLst>
+          </p:cNvPr>
+          <p:cNvSpPr/>
+          <p:nvPr/>
+        </p:nvSpPr>
+        <p:spPr>
+          <a:xfrm>
+            <a:off x="276837" y="285226"/>
+            <a:ext cx="11719420" cy="6392411"/>
+          </a:xfrm>
+          <a:prstGeom prst="rect">
+            <a:avLst/>
+          </a:prstGeom>
+          <a:solidFill>
+            <a:schemeClr val="accent6">
+              <a:lumMod val="20000"/>
+              <a:lumOff val="80000"/>
+            </a:schemeClr>
+          </a:solidFill>
+        </p:spPr>
+        <p:style>
+          <a:lnRef idx="2">
+            <a:schemeClr val="accent1">
+              <a:shade val="50000"/>
+            </a:schemeClr>
+          </a:lnRef>
+          <a:fillRef idx="1">
+            <a:schemeClr val="accent1"/>
+          </a:fillRef>
+          <a:effectRef idx="0">
+            <a:schemeClr val="accent1"/>
+          </a:effectRef>
+          <a:fontRef idx="minor">
+            <a:schemeClr val="lt1"/>
+          </a:fontRef>
+        </p:style>
+        <p:txBody>
+          <a:bodyPr rtlCol="0" anchor="ctr"/>
+          <a:lstStyle/>
+          <a:p>
+            <a:pPr algn="ctr"/>
+            <a:endParaRPr lang="en-IN"/>
+          </a:p>
+        </p:txBody>
+      </p:sp>
+      <p:sp>
+        <p:nvSpPr>
+          <p:cNvPr id="11" name="Oval 10">
+            <a:extLst>
+              <a:ext uri="{FF2B5EF4-FFF2-40B4-BE49-F238E27FC236}">
+                <a16:creationId xmlns:a16="http://schemas.microsoft.com/office/drawing/2014/main" id="{65884F18-861C-46D1-9A7A-0BD9B9F68569}"/>
+              </a:ext>
+            </a:extLst>
+          </p:cNvPr>
+          <p:cNvSpPr/>
+          <p:nvPr/>
+        </p:nvSpPr>
+        <p:spPr>
+          <a:xfrm>
+            <a:off x="1166070" y="2273417"/>
+            <a:ext cx="1359016" cy="796954"/>
+          </a:xfrm>
+          <a:prstGeom prst="ellipse">
+            <a:avLst/>
+          </a:prstGeom>
+          <a:solidFill>
+            <a:schemeClr val="accent3">
+              <a:lumMod val="60000"/>
+              <a:lumOff val="40000"/>
+            </a:schemeClr>
+          </a:solidFill>
+        </p:spPr>
+        <p:style>
+          <a:lnRef idx="2">
+            <a:schemeClr val="accent1">
+              <a:shade val="50000"/>
+            </a:schemeClr>
+          </a:lnRef>
+          <a:fillRef idx="1">
+            <a:schemeClr val="accent1"/>
+          </a:fillRef>
+          <a:effectRef idx="0">
+            <a:schemeClr val="accent1"/>
+          </a:effectRef>
+          <a:fontRef idx="minor">
+            <a:schemeClr val="lt1"/>
+          </a:fontRef>
+        </p:style>
+        <p:txBody>
+          <a:bodyPr rtlCol="0" anchor="ctr"/>
+          <a:lstStyle/>
+          <a:p>
+            <a:pPr algn="ctr"/>
+            <a:endParaRPr lang="en-IN"/>
+          </a:p>
+        </p:txBody>
+      </p:sp>
+      <p:sp>
+        <p:nvSpPr>
+          <p:cNvPr id="13" name="TextBox 12">
+            <a:extLst>
+              <a:ext uri="{FF2B5EF4-FFF2-40B4-BE49-F238E27FC236}">
+                <a16:creationId xmlns:a16="http://schemas.microsoft.com/office/drawing/2014/main" id="{E6F0804D-D456-498D-AB97-88BAFC774138}"/>
+              </a:ext>
+            </a:extLst>
+          </p:cNvPr>
+          <p:cNvSpPr txBox="1"/>
+          <p:nvPr/>
+        </p:nvSpPr>
+        <p:spPr>
+          <a:xfrm>
+            <a:off x="1463878" y="2487228"/>
+            <a:ext cx="763399" cy="369332"/>
+          </a:xfrm>
+          <a:prstGeom prst="rect">
+            <a:avLst/>
+          </a:prstGeom>
+          <a:noFill/>
+        </p:spPr>
+        <p:txBody>
+          <a:bodyPr wrap="square" rtlCol="0">
+            <a:spAutoFit/>
+          </a:bodyPr>
+          <a:lstStyle/>
+          <a:p>
+            <a:r>
+              <a:rPr lang="en-US" dirty="0"/>
+              <a:t>Users</a:t>
+            </a:r>
+            <a:endParaRPr lang="en-IN" dirty="0"/>
+          </a:p>
+        </p:txBody>
+      </p:sp>
+      <p:sp>
+        <p:nvSpPr>
+          <p:cNvPr id="15" name="Rectangle 14">
+            <a:extLst>
+              <a:ext uri="{FF2B5EF4-FFF2-40B4-BE49-F238E27FC236}">
+                <a16:creationId xmlns:a16="http://schemas.microsoft.com/office/drawing/2014/main" id="{6CAC36D8-09AB-4AD1-BE25-DEDDB30E5737}"/>
+              </a:ext>
+            </a:extLst>
+          </p:cNvPr>
+          <p:cNvSpPr/>
+          <p:nvPr/>
+        </p:nvSpPr>
+        <p:spPr>
+          <a:xfrm>
+            <a:off x="4035105" y="612396"/>
+            <a:ext cx="1384183" cy="838899"/>
+          </a:xfrm>
+          <a:prstGeom prst="rect">
+            <a:avLst/>
+          </a:prstGeom>
+          <a:solidFill>
+            <a:schemeClr val="accent4"/>
+          </a:solidFill>
+        </p:spPr>
+        <p:style>
+          <a:lnRef idx="2">
+            <a:schemeClr val="accent1">
+              <a:shade val="50000"/>
+            </a:schemeClr>
+          </a:lnRef>
+          <a:fillRef idx="1">
+            <a:schemeClr val="accent1"/>
+          </a:fillRef>
+          <a:effectRef idx="0">
+            <a:schemeClr val="accent1"/>
+          </a:effectRef>
+          <a:fontRef idx="minor">
+            <a:schemeClr val="lt1"/>
+          </a:fontRef>
+        </p:style>
+        <p:txBody>
+          <a:bodyPr rtlCol="0" anchor="ctr"/>
+          <a:lstStyle/>
+          <a:p>
+            <a:pPr algn="ctr"/>
+            <a:r>
+              <a:rPr lang="en-US" dirty="0"/>
+              <a:t>Git-Hub</a:t>
+            </a:r>
+            <a:endParaRPr lang="en-IN" dirty="0"/>
+          </a:p>
+        </p:txBody>
+      </p:sp>
+      <p:sp>
+        <p:nvSpPr>
+          <p:cNvPr id="42" name="Rectangle 41">
+            <a:extLst>
+              <a:ext uri="{FF2B5EF4-FFF2-40B4-BE49-F238E27FC236}">
+                <a16:creationId xmlns:a16="http://schemas.microsoft.com/office/drawing/2014/main" id="{EE926F0F-CD2D-4E39-9944-3A9E769115A3}"/>
+              </a:ext>
+            </a:extLst>
+          </p:cNvPr>
+          <p:cNvSpPr/>
+          <p:nvPr/>
+        </p:nvSpPr>
+        <p:spPr>
+          <a:xfrm>
+            <a:off x="4035105" y="2067778"/>
+            <a:ext cx="1384183" cy="838899"/>
+          </a:xfrm>
+          <a:prstGeom prst="rect">
+            <a:avLst/>
+          </a:prstGeom>
+          <a:solidFill>
+            <a:schemeClr val="accent4"/>
+          </a:solidFill>
+        </p:spPr>
+        <p:style>
+          <a:lnRef idx="2">
+            <a:schemeClr val="accent1">
+              <a:shade val="50000"/>
+            </a:schemeClr>
+          </a:lnRef>
+          <a:fillRef idx="1">
+            <a:schemeClr val="accent1"/>
+          </a:fillRef>
+          <a:effectRef idx="0">
+            <a:schemeClr val="accent1"/>
+          </a:effectRef>
+          <a:fontRef idx="minor">
+            <a:schemeClr val="lt1"/>
+          </a:fontRef>
+        </p:style>
+        <p:txBody>
+          <a:bodyPr rtlCol="0" anchor="ctr"/>
+          <a:lstStyle/>
+          <a:p>
+            <a:pPr algn="ctr"/>
+            <a:r>
+              <a:rPr lang="en-US" dirty="0"/>
+              <a:t>Jenkins</a:t>
+            </a:r>
+            <a:endParaRPr lang="en-IN" dirty="0"/>
+          </a:p>
+        </p:txBody>
+      </p:sp>
+      <p:sp>
+        <p:nvSpPr>
+          <p:cNvPr id="43" name="Rectangle 42">
+            <a:extLst>
+              <a:ext uri="{FF2B5EF4-FFF2-40B4-BE49-F238E27FC236}">
+                <a16:creationId xmlns:a16="http://schemas.microsoft.com/office/drawing/2014/main" id="{994709FF-841F-4FE3-89D7-51F701FA6017}"/>
+              </a:ext>
+            </a:extLst>
+          </p:cNvPr>
+          <p:cNvSpPr/>
+          <p:nvPr/>
+        </p:nvSpPr>
+        <p:spPr>
+          <a:xfrm>
+            <a:off x="7140430" y="2067778"/>
+            <a:ext cx="1384183" cy="838899"/>
+          </a:xfrm>
+          <a:prstGeom prst="rect">
+            <a:avLst/>
+          </a:prstGeom>
+          <a:solidFill>
+            <a:schemeClr val="accent4"/>
+          </a:solidFill>
+        </p:spPr>
+        <p:style>
+          <a:lnRef idx="2">
+            <a:schemeClr val="accent1">
+              <a:shade val="50000"/>
+            </a:schemeClr>
+          </a:lnRef>
+          <a:fillRef idx="1">
+            <a:schemeClr val="accent1"/>
+          </a:fillRef>
+          <a:effectRef idx="0">
+            <a:schemeClr val="accent1"/>
+          </a:effectRef>
+          <a:fontRef idx="minor">
+            <a:schemeClr val="lt1"/>
+          </a:fontRef>
+        </p:style>
+        <p:txBody>
+          <a:bodyPr rtlCol="0" anchor="ctr"/>
+          <a:lstStyle/>
+          <a:p>
+            <a:pPr algn="ctr"/>
+            <a:r>
+              <a:rPr lang="en-US" dirty="0"/>
+              <a:t>Artifactory</a:t>
+            </a:r>
+            <a:endParaRPr lang="en-IN" dirty="0"/>
+          </a:p>
+        </p:txBody>
+      </p:sp>
+      <p:sp>
+        <p:nvSpPr>
+          <p:cNvPr id="46" name="Rectangle 45">
+            <a:extLst>
+              <a:ext uri="{FF2B5EF4-FFF2-40B4-BE49-F238E27FC236}">
+                <a16:creationId xmlns:a16="http://schemas.microsoft.com/office/drawing/2014/main" id="{632615E7-6388-4D82-A2C6-C39530F8179A}"/>
+              </a:ext>
+            </a:extLst>
+          </p:cNvPr>
+          <p:cNvSpPr/>
+          <p:nvPr/>
+        </p:nvSpPr>
+        <p:spPr>
+          <a:xfrm>
+            <a:off x="4035105" y="3456265"/>
+            <a:ext cx="1384183" cy="838899"/>
+          </a:xfrm>
+          <a:prstGeom prst="rect">
+            <a:avLst/>
+          </a:prstGeom>
+          <a:solidFill>
+            <a:schemeClr val="accent4"/>
+          </a:solidFill>
+        </p:spPr>
+        <p:style>
+          <a:lnRef idx="2">
+            <a:schemeClr val="accent1">
+              <a:shade val="50000"/>
+            </a:schemeClr>
+          </a:lnRef>
+          <a:fillRef idx="1">
+            <a:schemeClr val="accent1"/>
+          </a:fillRef>
+          <a:effectRef idx="0">
+            <a:schemeClr val="accent1"/>
+          </a:effectRef>
+          <a:fontRef idx="minor">
+            <a:schemeClr val="lt1"/>
+          </a:fontRef>
+        </p:style>
+        <p:txBody>
+          <a:bodyPr rtlCol="0" anchor="ctr"/>
+          <a:lstStyle/>
+          <a:p>
+            <a:pPr algn="ctr"/>
+            <a:r>
+              <a:rPr lang="en-US" dirty="0"/>
+              <a:t>Nexus</a:t>
+            </a:r>
+            <a:endParaRPr lang="en-IN" dirty="0"/>
+          </a:p>
+        </p:txBody>
+      </p:sp>
+      <p:sp>
+        <p:nvSpPr>
+          <p:cNvPr id="48" name="Rectangle 47">
+            <a:extLst>
+              <a:ext uri="{FF2B5EF4-FFF2-40B4-BE49-F238E27FC236}">
+                <a16:creationId xmlns:a16="http://schemas.microsoft.com/office/drawing/2014/main" id="{0F590AF3-868C-4633-80A1-72B4E331B8FD}"/>
+              </a:ext>
+            </a:extLst>
+          </p:cNvPr>
+          <p:cNvSpPr/>
+          <p:nvPr/>
+        </p:nvSpPr>
+        <p:spPr>
+          <a:xfrm>
+            <a:off x="4035105" y="4778821"/>
+            <a:ext cx="1384183" cy="838899"/>
+          </a:xfrm>
+          <a:prstGeom prst="rect">
+            <a:avLst/>
+          </a:prstGeom>
+          <a:solidFill>
+            <a:schemeClr val="accent4"/>
+          </a:solidFill>
+        </p:spPr>
+        <p:style>
+          <a:lnRef idx="2">
+            <a:schemeClr val="accent1">
+              <a:shade val="50000"/>
+            </a:schemeClr>
+          </a:lnRef>
+          <a:fillRef idx="1">
+            <a:schemeClr val="accent1"/>
+          </a:fillRef>
+          <a:effectRef idx="0">
+            <a:schemeClr val="accent1"/>
+          </a:effectRef>
+          <a:fontRef idx="minor">
+            <a:schemeClr val="lt1"/>
+          </a:fontRef>
+        </p:style>
+        <p:txBody>
+          <a:bodyPr rtlCol="0" anchor="ctr"/>
+          <a:lstStyle/>
+          <a:p>
+            <a:pPr algn="ctr"/>
+            <a:r>
+              <a:rPr lang="en-US" dirty="0"/>
+              <a:t>Ansible</a:t>
+            </a:r>
+            <a:endParaRPr lang="en-IN" dirty="0"/>
+          </a:p>
+        </p:txBody>
+      </p:sp>
+      <p:sp>
+        <p:nvSpPr>
+          <p:cNvPr id="49" name="Rectangle 48">
+            <a:extLst>
+              <a:ext uri="{FF2B5EF4-FFF2-40B4-BE49-F238E27FC236}">
+                <a16:creationId xmlns:a16="http://schemas.microsoft.com/office/drawing/2014/main" id="{0E55BBBB-1D11-4CD8-BE15-80ADAEF01403}"/>
+              </a:ext>
+            </a:extLst>
+          </p:cNvPr>
+          <p:cNvSpPr/>
+          <p:nvPr/>
+        </p:nvSpPr>
+        <p:spPr>
+          <a:xfrm>
+            <a:off x="7323589" y="3988768"/>
+            <a:ext cx="1384183" cy="838899"/>
+          </a:xfrm>
+          <a:prstGeom prst="rect">
+            <a:avLst/>
+          </a:prstGeom>
+          <a:solidFill>
+            <a:schemeClr val="accent4"/>
+          </a:solidFill>
+        </p:spPr>
+        <p:style>
+          <a:lnRef idx="2">
+            <a:schemeClr val="accent1">
+              <a:shade val="50000"/>
+            </a:schemeClr>
+          </a:lnRef>
+          <a:fillRef idx="1">
+            <a:schemeClr val="accent1"/>
+          </a:fillRef>
+          <a:effectRef idx="0">
+            <a:schemeClr val="accent1"/>
+          </a:effectRef>
+          <a:fontRef idx="minor">
+            <a:schemeClr val="lt1"/>
+          </a:fontRef>
+        </p:style>
+        <p:txBody>
+          <a:bodyPr rtlCol="0" anchor="ctr"/>
+          <a:lstStyle/>
+          <a:p>
+            <a:pPr algn="ctr"/>
+            <a:r>
+              <a:rPr lang="en-US" dirty="0"/>
+              <a:t>DC- Servers</a:t>
+            </a:r>
+          </a:p>
+          <a:p>
+            <a:pPr algn="ctr"/>
+            <a:r>
+              <a:rPr lang="en-US" sz="1100" dirty="0"/>
+              <a:t>(Kafka, App, DB. Etc.)</a:t>
+            </a:r>
+            <a:endParaRPr lang="en-IN" sz="1100" dirty="0"/>
+          </a:p>
+        </p:txBody>
+      </p:sp>
+      <p:cxnSp>
+        <p:nvCxnSpPr>
+          <p:cNvPr id="38" name="Straight Connector 37">
+            <a:extLst>
+              <a:ext uri="{FF2B5EF4-FFF2-40B4-BE49-F238E27FC236}">
+                <a16:creationId xmlns:a16="http://schemas.microsoft.com/office/drawing/2014/main" id="{1CDA52A7-7B03-4B3A-BD16-B331F92D92E0}"/>
+              </a:ext>
+            </a:extLst>
+          </p:cNvPr>
+          <p:cNvCxnSpPr>
+            <a:cxnSpLocks/>
+            <a:stCxn id="11" idx="6"/>
+          </p:cNvCxnSpPr>
+          <p:nvPr/>
+        </p:nvCxnSpPr>
+        <p:spPr>
+          <a:xfrm>
+            <a:off x="2525086" y="2671894"/>
+            <a:ext cx="931178" cy="0"/>
+          </a:xfrm>
+          <a:prstGeom prst="line">
+            <a:avLst/>
+          </a:prstGeom>
+        </p:spPr>
+        <p:style>
+          <a:lnRef idx="3">
+            <a:schemeClr val="dk1"/>
+          </a:lnRef>
+          <a:fillRef idx="0">
+            <a:schemeClr val="dk1"/>
+          </a:fillRef>
+          <a:effectRef idx="2">
+            <a:schemeClr val="dk1"/>
+          </a:effectRef>
+          <a:fontRef idx="minor">
+            <a:schemeClr val="tx1"/>
+          </a:fontRef>
+        </p:style>
+      </p:cxnSp>
+      <p:cxnSp>
+        <p:nvCxnSpPr>
+          <p:cNvPr id="51" name="Straight Connector 50">
+            <a:extLst>
+              <a:ext uri="{FF2B5EF4-FFF2-40B4-BE49-F238E27FC236}">
+                <a16:creationId xmlns:a16="http://schemas.microsoft.com/office/drawing/2014/main" id="{F5B3D59A-3D77-4345-BB12-E73DB50529EA}"/>
+              </a:ext>
+            </a:extLst>
+          </p:cNvPr>
+          <p:cNvCxnSpPr>
+            <a:cxnSpLocks/>
+          </p:cNvCxnSpPr>
+          <p:nvPr/>
+        </p:nvCxnSpPr>
+        <p:spPr>
+          <a:xfrm flipV="1">
+            <a:off x="3456264" y="1031845"/>
+            <a:ext cx="0" cy="1640050"/>
+          </a:xfrm>
+          <a:prstGeom prst="line">
+            <a:avLst/>
+          </a:prstGeom>
+        </p:spPr>
+        <p:style>
+          <a:lnRef idx="3">
+            <a:schemeClr val="dk1"/>
+          </a:lnRef>
+          <a:fillRef idx="0">
+            <a:schemeClr val="dk1"/>
+          </a:fillRef>
+          <a:effectRef idx="2">
+            <a:schemeClr val="dk1"/>
+          </a:effectRef>
+          <a:fontRef idx="minor">
+            <a:schemeClr val="tx1"/>
+          </a:fontRef>
+        </p:style>
+      </p:cxnSp>
+      <p:cxnSp>
+        <p:nvCxnSpPr>
+          <p:cNvPr id="56" name="Straight Arrow Connector 55">
+            <a:extLst>
+              <a:ext uri="{FF2B5EF4-FFF2-40B4-BE49-F238E27FC236}">
+                <a16:creationId xmlns:a16="http://schemas.microsoft.com/office/drawing/2014/main" id="{4C7F8589-A367-4C78-8B73-DF113F2E5926}"/>
+              </a:ext>
+            </a:extLst>
+          </p:cNvPr>
+          <p:cNvCxnSpPr>
+            <a:endCxn id="15" idx="1"/>
+          </p:cNvCxnSpPr>
+          <p:nvPr/>
+        </p:nvCxnSpPr>
+        <p:spPr>
+          <a:xfrm>
+            <a:off x="3456264" y="1031845"/>
+            <a:ext cx="578841" cy="1"/>
+          </a:xfrm>
+          <a:prstGeom prst="straightConnector1">
+            <a:avLst/>
+          </a:prstGeom>
+          <a:ln>
+            <a:tailEnd type="triangle"/>
+          </a:ln>
+        </p:spPr>
+        <p:style>
+          <a:lnRef idx="3">
+            <a:schemeClr val="dk1"/>
+          </a:lnRef>
+          <a:fillRef idx="0">
+            <a:schemeClr val="dk1"/>
+          </a:fillRef>
+          <a:effectRef idx="2">
+            <a:schemeClr val="dk1"/>
+          </a:effectRef>
+          <a:fontRef idx="minor">
+            <a:schemeClr val="tx1"/>
+          </a:fontRef>
+        </p:style>
+      </p:cxnSp>
+      <p:sp>
+        <p:nvSpPr>
+          <p:cNvPr id="58" name="TextBox 57">
+            <a:extLst>
+              <a:ext uri="{FF2B5EF4-FFF2-40B4-BE49-F238E27FC236}">
+                <a16:creationId xmlns:a16="http://schemas.microsoft.com/office/drawing/2014/main" id="{3606CE72-2189-4596-BF1A-665C91E89B4D}"/>
+              </a:ext>
+            </a:extLst>
+          </p:cNvPr>
+          <p:cNvSpPr txBox="1"/>
+          <p:nvPr/>
+        </p:nvSpPr>
+        <p:spPr>
+          <a:xfrm>
+            <a:off x="2964124" y="1728132"/>
+            <a:ext cx="704662" cy="338554"/>
+          </a:xfrm>
+          <a:prstGeom prst="rect">
+            <a:avLst/>
+          </a:prstGeom>
+          <a:noFill/>
+        </p:spPr>
+        <p:txBody>
+          <a:bodyPr wrap="square" rtlCol="0">
+            <a:spAutoFit/>
+          </a:bodyPr>
+          <a:lstStyle/>
+          <a:p>
+            <a:r>
+              <a:rPr lang="en-US" sz="800" b="1" dirty="0"/>
+              <a:t>New Changes</a:t>
+            </a:r>
+            <a:endParaRPr lang="en-IN" sz="800" b="1" dirty="0"/>
+          </a:p>
+        </p:txBody>
+      </p:sp>
+      <p:cxnSp>
+        <p:nvCxnSpPr>
+          <p:cNvPr id="62" name="Straight Arrow Connector 61">
+            <a:extLst>
+              <a:ext uri="{FF2B5EF4-FFF2-40B4-BE49-F238E27FC236}">
+                <a16:creationId xmlns:a16="http://schemas.microsoft.com/office/drawing/2014/main" id="{D4F58E3C-4383-4A72-9E31-41D7B3929CF8}"/>
+              </a:ext>
+            </a:extLst>
+          </p:cNvPr>
+          <p:cNvCxnSpPr>
+            <a:cxnSpLocks/>
+          </p:cNvCxnSpPr>
+          <p:nvPr/>
+        </p:nvCxnSpPr>
+        <p:spPr>
+          <a:xfrm flipV="1">
+            <a:off x="4823670" y="1451295"/>
+            <a:ext cx="0" cy="615391"/>
+          </a:xfrm>
+          <a:prstGeom prst="straightConnector1">
+            <a:avLst/>
+          </a:prstGeom>
+          <a:ln>
+            <a:tailEnd type="triangle"/>
+          </a:ln>
+        </p:spPr>
+        <p:style>
+          <a:lnRef idx="3">
+            <a:schemeClr val="dk1"/>
+          </a:lnRef>
+          <a:fillRef idx="0">
+            <a:schemeClr val="dk1"/>
+          </a:fillRef>
+          <a:effectRef idx="2">
+            <a:schemeClr val="dk1"/>
+          </a:effectRef>
+          <a:fontRef idx="minor">
+            <a:schemeClr val="tx1"/>
+          </a:fontRef>
+        </p:style>
+      </p:cxnSp>
+      <p:sp>
+        <p:nvSpPr>
+          <p:cNvPr id="65" name="TextBox 64">
+            <a:extLst>
+              <a:ext uri="{FF2B5EF4-FFF2-40B4-BE49-F238E27FC236}">
+                <a16:creationId xmlns:a16="http://schemas.microsoft.com/office/drawing/2014/main" id="{1F30084A-6094-49BC-A3AD-35ADBD623EE0}"/>
+              </a:ext>
+            </a:extLst>
+          </p:cNvPr>
+          <p:cNvSpPr txBox="1"/>
+          <p:nvPr/>
+        </p:nvSpPr>
+        <p:spPr>
+          <a:xfrm flipH="1">
+            <a:off x="4362276" y="1535185"/>
+            <a:ext cx="1115726" cy="338554"/>
+          </a:xfrm>
+          <a:prstGeom prst="rect">
+            <a:avLst/>
+          </a:prstGeom>
+          <a:noFill/>
+        </p:spPr>
+        <p:txBody>
+          <a:bodyPr wrap="square" rtlCol="0">
+            <a:spAutoFit/>
+          </a:bodyPr>
+          <a:lstStyle/>
+          <a:p>
+            <a:r>
+              <a:rPr lang="en-US" sz="800" b="1" dirty="0"/>
+              <a:t>Pull Changes from branch</a:t>
+            </a:r>
+            <a:endParaRPr lang="en-IN" sz="800" b="1" dirty="0"/>
+          </a:p>
+        </p:txBody>
+      </p:sp>
+      <p:cxnSp>
+        <p:nvCxnSpPr>
+          <p:cNvPr id="66" name="Straight Arrow Connector 65">
+            <a:extLst>
+              <a:ext uri="{FF2B5EF4-FFF2-40B4-BE49-F238E27FC236}">
+                <a16:creationId xmlns:a16="http://schemas.microsoft.com/office/drawing/2014/main" id="{197CE90A-51A1-471C-9724-B7A0723EBEFC}"/>
+              </a:ext>
+            </a:extLst>
+          </p:cNvPr>
+          <p:cNvCxnSpPr>
+            <a:cxnSpLocks/>
+          </p:cNvCxnSpPr>
+          <p:nvPr/>
+        </p:nvCxnSpPr>
+        <p:spPr>
+          <a:xfrm flipH="1">
+            <a:off x="5419288" y="2189527"/>
+            <a:ext cx="1721142" cy="0"/>
+          </a:xfrm>
+          <a:prstGeom prst="straightConnector1">
+            <a:avLst/>
+          </a:prstGeom>
+          <a:ln>
+            <a:tailEnd type="triangle"/>
+          </a:ln>
+        </p:spPr>
+        <p:style>
+          <a:lnRef idx="3">
+            <a:schemeClr val="dk1"/>
+          </a:lnRef>
+          <a:fillRef idx="0">
+            <a:schemeClr val="dk1"/>
+          </a:fillRef>
+          <a:effectRef idx="2">
+            <a:schemeClr val="dk1"/>
+          </a:effectRef>
+          <a:fontRef idx="minor">
+            <a:schemeClr val="tx1"/>
+          </a:fontRef>
+        </p:style>
+      </p:cxnSp>
+      <p:sp>
+        <p:nvSpPr>
+          <p:cNvPr id="71" name="TextBox 70">
+            <a:extLst>
+              <a:ext uri="{FF2B5EF4-FFF2-40B4-BE49-F238E27FC236}">
+                <a16:creationId xmlns:a16="http://schemas.microsoft.com/office/drawing/2014/main" id="{9734E153-52E9-4179-8D95-7DA059C89FD8}"/>
+              </a:ext>
+            </a:extLst>
+          </p:cNvPr>
+          <p:cNvSpPr txBox="1"/>
+          <p:nvPr/>
+        </p:nvSpPr>
+        <p:spPr>
+          <a:xfrm flipH="1">
+            <a:off x="5798210" y="1897409"/>
+            <a:ext cx="1115726" cy="215444"/>
+          </a:xfrm>
+          <a:prstGeom prst="rect">
+            <a:avLst/>
+          </a:prstGeom>
+          <a:noFill/>
+        </p:spPr>
+        <p:txBody>
+          <a:bodyPr wrap="square" rtlCol="0">
+            <a:spAutoFit/>
+          </a:bodyPr>
+          <a:lstStyle/>
+          <a:p>
+            <a:r>
+              <a:rPr lang="en-US" sz="800" b="1" dirty="0"/>
+              <a:t>Get dependencies</a:t>
+            </a:r>
+            <a:endParaRPr lang="en-IN" sz="800" b="1" dirty="0"/>
+          </a:p>
+        </p:txBody>
+      </p:sp>
+      <p:cxnSp>
+        <p:nvCxnSpPr>
+          <p:cNvPr id="72" name="Straight Arrow Connector 71">
+            <a:extLst>
+              <a:ext uri="{FF2B5EF4-FFF2-40B4-BE49-F238E27FC236}">
+                <a16:creationId xmlns:a16="http://schemas.microsoft.com/office/drawing/2014/main" id="{F89792DF-FD89-4254-84E7-0B38A341F46E}"/>
+              </a:ext>
+            </a:extLst>
+          </p:cNvPr>
+          <p:cNvCxnSpPr>
+            <a:cxnSpLocks/>
+          </p:cNvCxnSpPr>
+          <p:nvPr/>
+        </p:nvCxnSpPr>
+        <p:spPr>
+          <a:xfrm>
+            <a:off x="5419288" y="2487227"/>
+            <a:ext cx="1721142" cy="0"/>
+          </a:xfrm>
+          <a:prstGeom prst="straightConnector1">
+            <a:avLst/>
+          </a:prstGeom>
+          <a:ln>
+            <a:tailEnd type="triangle"/>
+          </a:ln>
+        </p:spPr>
+        <p:style>
+          <a:lnRef idx="3">
+            <a:schemeClr val="dk1"/>
+          </a:lnRef>
+          <a:fillRef idx="0">
+            <a:schemeClr val="dk1"/>
+          </a:fillRef>
+          <a:effectRef idx="2">
+            <a:schemeClr val="dk1"/>
+          </a:effectRef>
+          <a:fontRef idx="minor">
+            <a:schemeClr val="tx1"/>
+          </a:fontRef>
+        </p:style>
+      </p:cxnSp>
+      <p:sp>
+        <p:nvSpPr>
+          <p:cNvPr id="77" name="TextBox 76">
+            <a:extLst>
+              <a:ext uri="{FF2B5EF4-FFF2-40B4-BE49-F238E27FC236}">
+                <a16:creationId xmlns:a16="http://schemas.microsoft.com/office/drawing/2014/main" id="{B9F7871E-C1DC-4804-B968-CADD440DFF20}"/>
+              </a:ext>
+            </a:extLst>
+          </p:cNvPr>
+          <p:cNvSpPr txBox="1"/>
+          <p:nvPr/>
+        </p:nvSpPr>
+        <p:spPr>
+          <a:xfrm flipH="1">
+            <a:off x="5817795" y="2451055"/>
+            <a:ext cx="1115726" cy="215444"/>
+          </a:xfrm>
+          <a:prstGeom prst="rect">
+            <a:avLst/>
+          </a:prstGeom>
+          <a:noFill/>
+        </p:spPr>
+        <p:txBody>
+          <a:bodyPr wrap="square" rtlCol="0">
+            <a:spAutoFit/>
+          </a:bodyPr>
+          <a:lstStyle/>
+          <a:p>
+            <a:r>
+              <a:rPr lang="en-US" sz="800" b="1" dirty="0"/>
+              <a:t>Store Packages</a:t>
+            </a:r>
+            <a:endParaRPr lang="en-IN" sz="800" b="1" dirty="0"/>
+          </a:p>
+        </p:txBody>
+      </p:sp>
+      <p:cxnSp>
+        <p:nvCxnSpPr>
+          <p:cNvPr id="78" name="Straight Connector 77">
+            <a:extLst>
+              <a:ext uri="{FF2B5EF4-FFF2-40B4-BE49-F238E27FC236}">
+                <a16:creationId xmlns:a16="http://schemas.microsoft.com/office/drawing/2014/main" id="{376C28B9-60C8-405D-BEB2-BA59C889645B}"/>
+              </a:ext>
+            </a:extLst>
+          </p:cNvPr>
+          <p:cNvCxnSpPr>
+            <a:cxnSpLocks/>
+          </p:cNvCxnSpPr>
+          <p:nvPr/>
+        </p:nvCxnSpPr>
+        <p:spPr>
+          <a:xfrm>
+            <a:off x="5432571" y="3537358"/>
+            <a:ext cx="2318857" cy="0"/>
+          </a:xfrm>
+          <a:prstGeom prst="line">
+            <a:avLst/>
+          </a:prstGeom>
+        </p:spPr>
+        <p:style>
+          <a:lnRef idx="3">
+            <a:schemeClr val="dk1"/>
+          </a:lnRef>
+          <a:fillRef idx="0">
+            <a:schemeClr val="dk1"/>
+          </a:fillRef>
+          <a:effectRef idx="2">
+            <a:schemeClr val="dk1"/>
+          </a:effectRef>
+          <a:fontRef idx="minor">
+            <a:schemeClr val="tx1"/>
+          </a:fontRef>
+        </p:style>
+      </p:cxnSp>
+      <p:cxnSp>
+        <p:nvCxnSpPr>
+          <p:cNvPr id="80" name="Straight Arrow Connector 79">
+            <a:extLst>
+              <a:ext uri="{FF2B5EF4-FFF2-40B4-BE49-F238E27FC236}">
+                <a16:creationId xmlns:a16="http://schemas.microsoft.com/office/drawing/2014/main" id="{F0FFBBE8-250E-4605-877A-EB853F664DF3}"/>
+              </a:ext>
+            </a:extLst>
+          </p:cNvPr>
+          <p:cNvCxnSpPr>
+            <a:cxnSpLocks/>
+          </p:cNvCxnSpPr>
+          <p:nvPr/>
+        </p:nvCxnSpPr>
+        <p:spPr>
+          <a:xfrm flipV="1">
+            <a:off x="7751428" y="2912378"/>
+            <a:ext cx="0" cy="615391"/>
+          </a:xfrm>
+          <a:prstGeom prst="straightConnector1">
+            <a:avLst/>
+          </a:prstGeom>
+          <a:ln>
+            <a:tailEnd type="triangle"/>
+          </a:ln>
+        </p:spPr>
+        <p:style>
+          <a:lnRef idx="3">
+            <a:schemeClr val="dk1"/>
+          </a:lnRef>
+          <a:fillRef idx="0">
+            <a:schemeClr val="dk1"/>
+          </a:fillRef>
+          <a:effectRef idx="2">
+            <a:schemeClr val="dk1"/>
+          </a:effectRef>
+          <a:fontRef idx="minor">
+            <a:schemeClr val="tx1"/>
+          </a:fontRef>
+        </p:style>
+      </p:cxnSp>
+      <p:sp>
+        <p:nvSpPr>
+          <p:cNvPr id="82" name="TextBox 81">
+            <a:extLst>
+              <a:ext uri="{FF2B5EF4-FFF2-40B4-BE49-F238E27FC236}">
+                <a16:creationId xmlns:a16="http://schemas.microsoft.com/office/drawing/2014/main" id="{0FBCA8C0-9112-46C7-AEFD-87152998F874}"/>
+              </a:ext>
+            </a:extLst>
+          </p:cNvPr>
+          <p:cNvSpPr txBox="1"/>
+          <p:nvPr/>
+        </p:nvSpPr>
+        <p:spPr>
+          <a:xfrm flipH="1">
+            <a:off x="7751428" y="2982088"/>
+            <a:ext cx="1115726" cy="215444"/>
+          </a:xfrm>
+          <a:prstGeom prst="rect">
+            <a:avLst/>
+          </a:prstGeom>
+          <a:noFill/>
+        </p:spPr>
+        <p:txBody>
+          <a:bodyPr wrap="square" rtlCol="0">
+            <a:spAutoFit/>
+          </a:bodyPr>
+          <a:lstStyle/>
+          <a:p>
+            <a:r>
+              <a:rPr lang="en-US" sz="800" b="1" dirty="0"/>
+              <a:t>Pull pkg and images</a:t>
+            </a:r>
+            <a:endParaRPr lang="en-IN" sz="800" b="1" dirty="0"/>
+          </a:p>
+        </p:txBody>
+      </p:sp>
+      <p:cxnSp>
+        <p:nvCxnSpPr>
+          <p:cNvPr id="24" name="Straight Arrow Connector 23">
+            <a:extLst>
+              <a:ext uri="{FF2B5EF4-FFF2-40B4-BE49-F238E27FC236}">
+                <a16:creationId xmlns:a16="http://schemas.microsoft.com/office/drawing/2014/main" id="{98ABAA2E-418A-43B3-B0A8-9CDDD99C736E}"/>
+              </a:ext>
+            </a:extLst>
+          </p:cNvPr>
+          <p:cNvCxnSpPr>
+            <a:cxnSpLocks/>
+            <a:stCxn id="48" idx="0"/>
+          </p:cNvCxnSpPr>
+          <p:nvPr/>
+        </p:nvCxnSpPr>
+        <p:spPr>
+          <a:xfrm flipV="1">
+            <a:off x="4727197" y="4269781"/>
+            <a:ext cx="5592" cy="509040"/>
+          </a:xfrm>
+          <a:prstGeom prst="straightConnector1">
+            <a:avLst/>
+          </a:prstGeom>
+          <a:ln>
+            <a:tailEnd type="triangle"/>
+          </a:ln>
+        </p:spPr>
+        <p:style>
+          <a:lnRef idx="3">
+            <a:schemeClr val="dk1"/>
+          </a:lnRef>
+          <a:fillRef idx="0">
+            <a:schemeClr val="dk1"/>
+          </a:fillRef>
+          <a:effectRef idx="2">
+            <a:schemeClr val="dk1"/>
+          </a:effectRef>
+          <a:fontRef idx="minor">
+            <a:schemeClr val="tx1"/>
+          </a:fontRef>
+        </p:style>
+      </p:cxnSp>
+      <p:cxnSp>
+        <p:nvCxnSpPr>
+          <p:cNvPr id="26" name="Straight Arrow Connector 25">
+            <a:extLst>
+              <a:ext uri="{FF2B5EF4-FFF2-40B4-BE49-F238E27FC236}">
+                <a16:creationId xmlns:a16="http://schemas.microsoft.com/office/drawing/2014/main" id="{2B4E86D9-E777-47CE-9989-72FDAF813EE3}"/>
+              </a:ext>
+            </a:extLst>
+          </p:cNvPr>
+          <p:cNvCxnSpPr>
+            <a:cxnSpLocks/>
+          </p:cNvCxnSpPr>
+          <p:nvPr/>
+        </p:nvCxnSpPr>
+        <p:spPr>
+          <a:xfrm>
+            <a:off x="3741490" y="5164713"/>
+            <a:ext cx="293615" cy="0"/>
+          </a:xfrm>
+          <a:prstGeom prst="straightConnector1">
+            <a:avLst/>
+          </a:prstGeom>
+          <a:ln>
+            <a:tailEnd type="triangle"/>
+          </a:ln>
+        </p:spPr>
+        <p:style>
+          <a:lnRef idx="3">
+            <a:schemeClr val="dk1"/>
+          </a:lnRef>
+          <a:fillRef idx="0">
+            <a:schemeClr val="dk1"/>
+          </a:fillRef>
+          <a:effectRef idx="2">
+            <a:schemeClr val="dk1"/>
+          </a:effectRef>
+          <a:fontRef idx="minor">
+            <a:schemeClr val="tx1"/>
+          </a:fontRef>
+        </p:style>
+      </p:cxnSp>
+      <p:cxnSp>
+        <p:nvCxnSpPr>
+          <p:cNvPr id="28" name="Straight Connector 27">
+            <a:extLst>
+              <a:ext uri="{FF2B5EF4-FFF2-40B4-BE49-F238E27FC236}">
+                <a16:creationId xmlns:a16="http://schemas.microsoft.com/office/drawing/2014/main" id="{CC682578-F962-43C7-B4A9-53917FB7F1CB}"/>
+              </a:ext>
+            </a:extLst>
+          </p:cNvPr>
+          <p:cNvCxnSpPr>
+            <a:cxnSpLocks/>
+          </p:cNvCxnSpPr>
+          <p:nvPr/>
+        </p:nvCxnSpPr>
+        <p:spPr>
+          <a:xfrm flipV="1">
+            <a:off x="3741490" y="2773851"/>
+            <a:ext cx="0" cy="2393767"/>
+          </a:xfrm>
+          <a:prstGeom prst="line">
+            <a:avLst/>
+          </a:prstGeom>
+        </p:spPr>
+        <p:style>
+          <a:lnRef idx="3">
+            <a:schemeClr val="dk1"/>
+          </a:lnRef>
+          <a:fillRef idx="0">
+            <a:schemeClr val="dk1"/>
+          </a:fillRef>
+          <a:effectRef idx="2">
+            <a:schemeClr val="dk1"/>
+          </a:effectRef>
+          <a:fontRef idx="minor">
+            <a:schemeClr val="tx1"/>
+          </a:fontRef>
+        </p:style>
+      </p:cxnSp>
+      <p:cxnSp>
+        <p:nvCxnSpPr>
+          <p:cNvPr id="32" name="Straight Connector 31">
+            <a:extLst>
+              <a:ext uri="{FF2B5EF4-FFF2-40B4-BE49-F238E27FC236}">
+                <a16:creationId xmlns:a16="http://schemas.microsoft.com/office/drawing/2014/main" id="{3F90BC35-28E5-4EC1-AB3F-CA0D663FD270}"/>
+              </a:ext>
+            </a:extLst>
+          </p:cNvPr>
+          <p:cNvCxnSpPr>
+            <a:cxnSpLocks/>
+          </p:cNvCxnSpPr>
+          <p:nvPr/>
+        </p:nvCxnSpPr>
+        <p:spPr>
+          <a:xfrm>
+            <a:off x="5419288" y="5191387"/>
+            <a:ext cx="2596392" cy="6883"/>
+          </a:xfrm>
+          <a:prstGeom prst="line">
+            <a:avLst/>
+          </a:prstGeom>
+        </p:spPr>
+        <p:style>
+          <a:lnRef idx="3">
+            <a:schemeClr val="dk1"/>
+          </a:lnRef>
+          <a:fillRef idx="0">
+            <a:schemeClr val="dk1"/>
+          </a:fillRef>
+          <a:effectRef idx="2">
+            <a:schemeClr val="dk1"/>
+          </a:effectRef>
+          <a:fontRef idx="minor">
+            <a:schemeClr val="tx1"/>
+          </a:fontRef>
+        </p:style>
+      </p:cxnSp>
+      <p:cxnSp>
+        <p:nvCxnSpPr>
+          <p:cNvPr id="34" name="Straight Arrow Connector 33">
+            <a:extLst>
+              <a:ext uri="{FF2B5EF4-FFF2-40B4-BE49-F238E27FC236}">
+                <a16:creationId xmlns:a16="http://schemas.microsoft.com/office/drawing/2014/main" id="{FB10B79A-2F72-42A1-864E-CEDA32DACC8E}"/>
+              </a:ext>
+            </a:extLst>
+          </p:cNvPr>
+          <p:cNvCxnSpPr>
+            <a:cxnSpLocks/>
+          </p:cNvCxnSpPr>
+          <p:nvPr/>
+        </p:nvCxnSpPr>
+        <p:spPr>
+          <a:xfrm flipV="1">
+            <a:off x="8008690" y="4827668"/>
+            <a:ext cx="0" cy="370602"/>
+          </a:xfrm>
+          <a:prstGeom prst="straightConnector1">
+            <a:avLst/>
+          </a:prstGeom>
+          <a:ln>
+            <a:tailEnd type="triangle"/>
+          </a:ln>
+        </p:spPr>
+        <p:style>
+          <a:lnRef idx="3">
+            <a:schemeClr val="dk1"/>
+          </a:lnRef>
+          <a:fillRef idx="0">
+            <a:schemeClr val="dk1"/>
+          </a:fillRef>
+          <a:effectRef idx="2">
+            <a:schemeClr val="dk1"/>
+          </a:effectRef>
+          <a:fontRef idx="minor">
+            <a:schemeClr val="tx1"/>
+          </a:fontRef>
+        </p:style>
+      </p:cxnSp>
+      <p:sp>
+        <p:nvSpPr>
+          <p:cNvPr id="37" name="TextBox 36">
+            <a:extLst>
+              <a:ext uri="{FF2B5EF4-FFF2-40B4-BE49-F238E27FC236}">
+                <a16:creationId xmlns:a16="http://schemas.microsoft.com/office/drawing/2014/main" id="{8DFE0CC1-37E7-4900-8AF7-047CEC833519}"/>
+              </a:ext>
+            </a:extLst>
+          </p:cNvPr>
+          <p:cNvSpPr txBox="1"/>
+          <p:nvPr/>
+        </p:nvSpPr>
+        <p:spPr>
+          <a:xfrm flipH="1">
+            <a:off x="4745388" y="4404257"/>
+            <a:ext cx="1115726" cy="215444"/>
+          </a:xfrm>
+          <a:prstGeom prst="rect">
+            <a:avLst/>
+          </a:prstGeom>
+          <a:noFill/>
+        </p:spPr>
+        <p:txBody>
+          <a:bodyPr wrap="square" rtlCol="0">
+            <a:spAutoFit/>
+          </a:bodyPr>
+          <a:lstStyle/>
+          <a:p>
+            <a:r>
+              <a:rPr lang="en-US" sz="800" b="1" dirty="0"/>
+              <a:t>Pull images and pkgs</a:t>
+            </a:r>
+            <a:endParaRPr lang="en-IN" sz="800" b="1" dirty="0"/>
+          </a:p>
+        </p:txBody>
+      </p:sp>
+      <p:sp>
+        <p:nvSpPr>
+          <p:cNvPr id="39" name="TextBox 38">
+            <a:extLst>
+              <a:ext uri="{FF2B5EF4-FFF2-40B4-BE49-F238E27FC236}">
+                <a16:creationId xmlns:a16="http://schemas.microsoft.com/office/drawing/2014/main" id="{76A4D9F5-A212-4714-A9C3-86F0304D0904}"/>
+              </a:ext>
+            </a:extLst>
+          </p:cNvPr>
+          <p:cNvSpPr txBox="1"/>
+          <p:nvPr/>
+        </p:nvSpPr>
+        <p:spPr>
+          <a:xfrm flipH="1">
+            <a:off x="3707944" y="4376095"/>
+            <a:ext cx="1115726" cy="215444"/>
+          </a:xfrm>
+          <a:prstGeom prst="rect">
+            <a:avLst/>
+          </a:prstGeom>
+          <a:noFill/>
+        </p:spPr>
+        <p:txBody>
+          <a:bodyPr wrap="square" rtlCol="0">
+            <a:spAutoFit/>
+          </a:bodyPr>
+          <a:lstStyle/>
+          <a:p>
+            <a:r>
+              <a:rPr lang="en-US" sz="800" b="1" dirty="0"/>
+              <a:t>Trigger Build</a:t>
+            </a:r>
+            <a:endParaRPr lang="en-IN" sz="800" b="1" dirty="0"/>
+          </a:p>
+        </p:txBody>
+      </p:sp>
+      <p:cxnSp>
+        <p:nvCxnSpPr>
+          <p:cNvPr id="40" name="Straight Connector 39">
+            <a:extLst>
+              <a:ext uri="{FF2B5EF4-FFF2-40B4-BE49-F238E27FC236}">
+                <a16:creationId xmlns:a16="http://schemas.microsoft.com/office/drawing/2014/main" id="{256F898D-DB5D-417A-A202-41F5358BF5C5}"/>
+              </a:ext>
+            </a:extLst>
+          </p:cNvPr>
+          <p:cNvCxnSpPr>
+            <a:cxnSpLocks/>
+          </p:cNvCxnSpPr>
+          <p:nvPr/>
+        </p:nvCxnSpPr>
+        <p:spPr>
+          <a:xfrm>
+            <a:off x="3741490" y="2796222"/>
+            <a:ext cx="293615" cy="0"/>
+          </a:xfrm>
+          <a:prstGeom prst="line">
+            <a:avLst/>
+          </a:prstGeom>
+        </p:spPr>
+        <p:style>
+          <a:lnRef idx="3">
+            <a:schemeClr val="dk1"/>
+          </a:lnRef>
+          <a:fillRef idx="0">
+            <a:schemeClr val="dk1"/>
+          </a:fillRef>
+          <a:effectRef idx="2">
+            <a:schemeClr val="dk1"/>
+          </a:effectRef>
+          <a:fontRef idx="minor">
+            <a:schemeClr val="tx1"/>
+          </a:fontRef>
+        </p:style>
+      </p:cxnSp>
+    </p:spTree>
+    <p:extLst>
+      <p:ext uri="{BB962C8B-B14F-4D97-AF65-F5344CB8AC3E}">
+        <p14:creationId xmlns:p14="http://schemas.microsoft.com/office/powerpoint/2010/main" val="518438305"/>
+      </p:ext>
+    </p:extLst>
+  </p:cSld>
+  <p:clrMapOvr>
+    <a:masterClrMapping/>
+  </p:clrMapOvr>
+</p:sld>
+</file>
+
 <file path=ppt/theme/theme1.xml><?xml version="1.0" encoding="utf-8"?>
 <a:theme xmlns:a="http://schemas.openxmlformats.org/drawingml/2006/main" name="Office Theme">
   <a:themeElements>

</xml_diff>